<commit_message>
Updated some PowerPoint info
</commit_message>
<xml_diff>
--- a/Azure-Bootcamp-Los-Angeles-April-2017.pptx
+++ b/Azure-Bootcamp-Los-Angeles-April-2017.pptx
@@ -228,7 +228,7 @@
           <a:p>
             <a:fld id="{024B4349-B75A-4D2F-AF41-056B05AD0257}" type="datetimeFigureOut">
               <a:rPr lang="en-US" smtClean="0"/>
-              <a:t>4/20/2017</a:t>
+              <a:t>4/21/2017</a:t>
             </a:fld>
             <a:endParaRPr lang="en-US"/>
           </a:p>
@@ -1800,7 +1800,7 @@
           <a:p>
             <a:fld id="{2D7670C4-9B15-42BD-9085-B68DEC83E822}" type="datetimeFigureOut">
               <a:rPr lang="en-US" smtClean="0"/>
-              <a:t>4/20/2017</a:t>
+              <a:t>4/21/2017</a:t>
             </a:fld>
             <a:endParaRPr lang="en-US"/>
           </a:p>
@@ -2054,7 +2054,7 @@
           <a:p>
             <a:fld id="{2D7670C4-9B15-42BD-9085-B68DEC83E822}" type="datetimeFigureOut">
               <a:rPr lang="en-US" smtClean="0"/>
-              <a:t>4/20/2017</a:t>
+              <a:t>4/21/2017</a:t>
             </a:fld>
             <a:endParaRPr lang="en-US"/>
           </a:p>
@@ -3653,7 +3653,7 @@
           <a:p>
             <a:fld id="{2D7670C4-9B15-42BD-9085-B68DEC83E822}" type="datetimeFigureOut">
               <a:rPr lang="en-US" smtClean="0"/>
-              <a:t>4/20/2017</a:t>
+              <a:t>4/21/2017</a:t>
             </a:fld>
             <a:endParaRPr lang="en-US"/>
           </a:p>
@@ -4846,7 +4846,6 @@
               <a:rPr lang="en-US" dirty="0" smtClean="0"/>
               <a:t> </a:t>
             </a:r>
-            <a:endParaRPr lang="en-US" dirty="0" smtClean="0"/>
           </a:p>
           <a:p>
             <a:r>
@@ -4873,7 +4872,6 @@
               <a:rPr lang="en-US" dirty="0" smtClean="0"/>
               <a:t> </a:t>
             </a:r>
-            <a:endParaRPr lang="en-US" dirty="0" smtClean="0"/>
           </a:p>
           <a:p>
             <a:r>
@@ -5016,11 +5014,7 @@
             </a:r>
             <a:r>
               <a:rPr lang="en-US" dirty="0" smtClean="0"/>
-              <a:t> Service (IAAS</a:t>
-            </a:r>
-            <a:r>
-              <a:rPr lang="en-US" dirty="0" smtClean="0"/>
-              <a:t>)</a:t>
+              <a:t> Service (IAAS)</a:t>
             </a:r>
           </a:p>
           <a:p>
@@ -5036,16 +5030,11 @@
               <a:rPr lang="en-US" dirty="0" smtClean="0"/>
               <a:t>Virtual Machines, etc.</a:t>
             </a:r>
-            <a:endParaRPr lang="en-US" dirty="0" smtClean="0"/>
           </a:p>
           <a:p>
             <a:r>
               <a:rPr lang="en-US" dirty="0" smtClean="0"/>
-              <a:t>Platform as a Service (PAAS</a:t>
-            </a:r>
-            <a:r>
-              <a:rPr lang="en-US" dirty="0" smtClean="0"/>
-              <a:t>)</a:t>
+              <a:t>Platform as a Service (PAAS)</a:t>
             </a:r>
           </a:p>
           <a:p>
@@ -5062,16 +5051,11 @@
               <a:rPr lang="en-US" dirty="0" smtClean="0"/>
               <a:t>, App Services, Blob Storage, etc.)</a:t>
             </a:r>
-            <a:endParaRPr lang="en-US" dirty="0" smtClean="0"/>
           </a:p>
           <a:p>
             <a:r>
               <a:rPr lang="en-US" dirty="0" smtClean="0"/>
-              <a:t>Software as a Service (SAAS</a:t>
-            </a:r>
-            <a:r>
-              <a:rPr lang="en-US" dirty="0" smtClean="0"/>
-              <a:t>)</a:t>
+              <a:t>Software as a Service (SAAS)</a:t>
             </a:r>
           </a:p>
           <a:p>
@@ -5080,7 +5064,6 @@
               <a:rPr lang="en-US" dirty="0" smtClean="0"/>
               <a:t>Working software applications</a:t>
             </a:r>
-            <a:endParaRPr lang="en-US" dirty="0" smtClean="0"/>
           </a:p>
           <a:p>
             <a:endParaRPr lang="en-US" dirty="0"/>
@@ -6240,12 +6223,8 @@
           <a:lstStyle/>
           <a:p>
             <a:r>
-              <a:rPr lang="en-US" dirty="0"/>
-              <a:t>In Terms of </a:t>
-            </a:r>
-            <a:r>
               <a:rPr lang="en-US" dirty="0" smtClean="0"/>
-              <a:t>JSON over REST</a:t>
+              <a:t>RESTful services using JSON</a:t>
             </a:r>
             <a:endParaRPr lang="en-US" dirty="0"/>
           </a:p>
@@ -6512,7 +6491,15 @@
           <a:p>
             <a:r>
               <a:rPr lang="en-US" dirty="0"/>
-              <a:t>JSON over REST is the de-facto standard</a:t>
+              <a:t>JSON </a:t>
+            </a:r>
+            <a:r>
+              <a:rPr lang="en-US" dirty="0" smtClean="0"/>
+              <a:t>is </a:t>
+            </a:r>
+            <a:r>
+              <a:rPr lang="en-US" dirty="0"/>
+              <a:t>the de-facto standard</a:t>
             </a:r>
           </a:p>
           <a:p>
@@ -6875,7 +6862,6 @@
               <a:rPr lang="en-US" dirty="0" smtClean="0"/>
               <a:t>Los Angeles, CA</a:t>
             </a:r>
-            <a:endParaRPr lang="en-US" dirty="0" smtClean="0"/>
           </a:p>
           <a:p>
             <a:r>
@@ -9539,11 +9525,7 @@
             <a:pPr lvl="1"/>
             <a:r>
               <a:rPr lang="en-US" dirty="0" smtClean="0"/>
-              <a:t>import </a:t>
-            </a:r>
-            <a:r>
-              <a:rPr lang="en-US" dirty="0" smtClean="0"/>
-              <a:t>'</a:t>
+              <a:t>import '</a:t>
             </a:r>
             <a:r>
               <a:rPr lang="en-US" dirty="0" err="1" smtClean="0"/>
@@ -9668,13 +9650,8 @@
             </a:r>
             <a:r>
               <a:rPr lang="en-US" sz="3200" dirty="0" smtClean="0"/>
-              <a:t>	2 </a:t>
-            </a:r>
-            <a:r>
-              <a:rPr lang="en-US" sz="3200" dirty="0" smtClean="0"/>
-              <a:t>way</a:t>
-            </a:r>
-            <a:endParaRPr lang="en-US" sz="3200" dirty="0" smtClean="0"/>
+              <a:t>	2 way</a:t>
+            </a:r>
           </a:p>
           <a:p>
             <a:endParaRPr lang="en-US" dirty="0"/>
@@ -10193,7 +10170,7 @@
         </p:spPr>
         <p:txBody>
           <a:bodyPr>
-            <a:normAutofit/>
+            <a:normAutofit lnSpcReduction="10000"/>
           </a:bodyPr>
           <a:lstStyle/>
           <a:p>
@@ -10239,8 +10216,19 @@
             </a:br>
             <a:r>
               <a:rPr lang="en-US" sz="2000" dirty="0"/>
-              <a:t>EPS Software Corp.  Houston, TX</a:t>
-            </a:r>
+              <a:t>EPS Software Corp.  Houston, </a:t>
+            </a:r>
+            <a:r>
+              <a:rPr lang="en-US" sz="2000" dirty="0" smtClean="0"/>
+              <a:t>TX</a:t>
+            </a:r>
+          </a:p>
+          <a:p>
+            <a:r>
+              <a:rPr lang="en-US" sz="2000" dirty="0" smtClean="0"/>
+              <a:t>Live in La Quinta, CA</a:t>
+            </a:r>
+            <a:endParaRPr lang="en-US" sz="2000" dirty="0"/>
           </a:p>
           <a:p>
             <a:r>
@@ -10694,7 +10682,7 @@
         <p:spPr>
           <a:xfrm>
             <a:off x="857983" y="1548131"/>
-            <a:ext cx="4444263" cy="4563582"/>
+            <a:ext cx="10679021" cy="4563582"/>
           </a:xfrm>
         </p:spPr>
         <p:txBody>
@@ -10743,7 +10731,21 @@
           <a:p>
             <a:r>
               <a:rPr lang="en-US" sz="2000" dirty="0" smtClean="0"/>
-              <a:t>Cloud Security Expert</a:t>
+              <a:t>Cloud Security </a:t>
+            </a:r>
+            <a:r>
+              <a:rPr lang="en-US" sz="2000" dirty="0" smtClean="0"/>
+              <a:t>Expert</a:t>
+            </a:r>
+          </a:p>
+          <a:p>
+            <a:r>
+              <a:rPr lang="en-US" sz="2000" dirty="0" smtClean="0"/>
+              <a:t>A 19-year </a:t>
+            </a:r>
+            <a:r>
+              <a:rPr lang="en-US" sz="2000" dirty="0"/>
+              <a:t>IT veteran wholly focused on ensuring organizations large and small are enabled to protect their data and infrastructure from malicious activity. Charles began his career in InfoSec securing communications for the Joint Chiefs of Staff and Joint Communications in the United States Navy. Prior to joining Alert Logic, Charles spent 4 years working as a consulting engineer and solutions architect helping organizations measure and address risk and operationalize investments in information systems security resources.</a:t>
             </a:r>
             <a:endParaRPr lang="en-US" sz="2000" dirty="0"/>
           </a:p>
@@ -11489,7 +11491,7 @@
           <p:cNvPr id="16" name="Picture 15">
             <a:extLst>
               <a:ext uri="{FF2B5EF4-FFF2-40B4-BE49-F238E27FC236}">
-                <a16:creationId xmlns:a16="http://schemas.microsoft.com/office/drawing/2014/main" xmlns="" id="{4600FE83-B74B-447D-BA9C-0F1A23D49796}"/>
+                <a16:creationId xmlns="" xmlns:a16="http://schemas.microsoft.com/office/drawing/2014/main" id="{4600FE83-B74B-447D-BA9C-0F1A23D49796}"/>
               </a:ext>
             </a:extLst>
           </p:cNvPr>
@@ -11525,7 +11527,7 @@
           <p:cNvPr id="21" name="Picture 20" descr="C:\Users\Mike\AppData\Local\Microsoft\Windows\INetCache\Content.Word\SentryOne-logo-300px.png">
             <a:extLst>
               <a:ext uri="{FF2B5EF4-FFF2-40B4-BE49-F238E27FC236}">
-                <a16:creationId xmlns:a16="http://schemas.microsoft.com/office/drawing/2014/main" xmlns="" id="{F7ED822C-9D0A-4C9A-A1B5-B08C3B186E7C}"/>
+                <a16:creationId xmlns="" xmlns:a16="http://schemas.microsoft.com/office/drawing/2014/main" id="{F7ED822C-9D0A-4C9A-A1B5-B08C3B186E7C}"/>
               </a:ext>
             </a:extLst>
           </p:cNvPr>
@@ -11564,7 +11566,7 @@
           <p:cNvPr id="22" name="Picture 21" descr="https://global.azurebootcamp.net/wp-content/uploads/2013/04/microsoft-dx-300x292.png">
             <a:extLst>
               <a:ext uri="{FF2B5EF4-FFF2-40B4-BE49-F238E27FC236}">
-                <a16:creationId xmlns:a16="http://schemas.microsoft.com/office/drawing/2014/main" xmlns="" id="{2592A8B3-9CB7-41AA-B644-25AE0333A6ED}"/>
+                <a16:creationId xmlns="" xmlns:a16="http://schemas.microsoft.com/office/drawing/2014/main" id="{2592A8B3-9CB7-41AA-B644-25AE0333A6ED}"/>
               </a:ext>
             </a:extLst>
           </p:cNvPr>
@@ -11662,14 +11664,14 @@
                 <a:gridCol w="3781425">
                   <a:extLst>
                     <a:ext uri="{9D8B030D-6E8A-4147-A177-3AD203B41FA5}">
-                      <a16:colId xmlns:a16="http://schemas.microsoft.com/office/drawing/2014/main" xmlns="" val="20000"/>
+                      <a16:colId xmlns="" xmlns:a16="http://schemas.microsoft.com/office/drawing/2014/main" val="20000"/>
                     </a:ext>
                   </a:extLst>
                 </a:gridCol>
                 <a:gridCol w="5248275">
                   <a:extLst>
                     <a:ext uri="{9D8B030D-6E8A-4147-A177-3AD203B41FA5}">
-                      <a16:colId xmlns:a16="http://schemas.microsoft.com/office/drawing/2014/main" xmlns="" val="20001"/>
+                      <a16:colId xmlns="" xmlns:a16="http://schemas.microsoft.com/office/drawing/2014/main" val="20001"/>
                     </a:ext>
                   </a:extLst>
                 </a:gridCol>
@@ -11737,7 +11739,7 @@
                 </a:tc>
                 <a:extLst>
                   <a:ext uri="{0D108BD9-81ED-4DB2-BD59-A6C34878D82A}">
-                    <a16:rowId xmlns:a16="http://schemas.microsoft.com/office/drawing/2014/main" xmlns="" val="10000"/>
+                    <a16:rowId xmlns="" xmlns:a16="http://schemas.microsoft.com/office/drawing/2014/main" val="10000"/>
                   </a:ext>
                 </a:extLst>
               </a:tr>
@@ -11831,7 +11833,7 @@
                 </a:tc>
                 <a:extLst>
                   <a:ext uri="{0D108BD9-81ED-4DB2-BD59-A6C34878D82A}">
-                    <a16:rowId xmlns:a16="http://schemas.microsoft.com/office/drawing/2014/main" xmlns="" val="10006"/>
+                    <a16:rowId xmlns="" xmlns:a16="http://schemas.microsoft.com/office/drawing/2014/main" val="10006"/>
                   </a:ext>
                 </a:extLst>
               </a:tr>
@@ -11928,7 +11930,7 @@
                 </a:tc>
                 <a:extLst>
                   <a:ext uri="{0D108BD9-81ED-4DB2-BD59-A6C34878D82A}">
-                    <a16:rowId xmlns:a16="http://schemas.microsoft.com/office/drawing/2014/main" xmlns="" val="10008"/>
+                    <a16:rowId xmlns="" xmlns:a16="http://schemas.microsoft.com/office/drawing/2014/main" val="10008"/>
                   </a:ext>
                 </a:extLst>
               </a:tr>
@@ -12028,7 +12030,7 @@
                 </a:tc>
                 <a:extLst>
                   <a:ext uri="{0D108BD9-81ED-4DB2-BD59-A6C34878D82A}">
-                    <a16:rowId xmlns:a16="http://schemas.microsoft.com/office/drawing/2014/main" xmlns="" val="279315004"/>
+                    <a16:rowId xmlns="" xmlns:a16="http://schemas.microsoft.com/office/drawing/2014/main" val="279315004"/>
                   </a:ext>
                 </a:extLst>
               </a:tr>
@@ -12130,7 +12132,7 @@
                 </a:tc>
                 <a:extLst>
                   <a:ext uri="{0D108BD9-81ED-4DB2-BD59-A6C34878D82A}">
-                    <a16:rowId xmlns:a16="http://schemas.microsoft.com/office/drawing/2014/main" xmlns="" val="1707420635"/>
+                    <a16:rowId xmlns="" xmlns:a16="http://schemas.microsoft.com/office/drawing/2014/main" val="1707420635"/>
                   </a:ext>
                 </a:extLst>
               </a:tr>
@@ -12219,7 +12221,7 @@
           <p:cNvPr id="11" name="Picture 10">
             <a:extLst>
               <a:ext uri="{FF2B5EF4-FFF2-40B4-BE49-F238E27FC236}">
-                <a16:creationId xmlns:a16="http://schemas.microsoft.com/office/drawing/2014/main" xmlns="" id="{9AFB916C-68FD-4EAB-9050-741974400DED}"/>
+                <a16:creationId xmlns="" xmlns:a16="http://schemas.microsoft.com/office/drawing/2014/main" id="{9AFB916C-68FD-4EAB-9050-741974400DED}"/>
               </a:ext>
             </a:extLst>
           </p:cNvPr>
@@ -12255,7 +12257,7 @@
           <p:cNvPr id="12" name="Picture 11" descr="C:\Users\Mike\AppData\Local\Microsoft\Windows\INetCache\Content.Word\SentryOne-logo-300px.png">
             <a:extLst>
               <a:ext uri="{FF2B5EF4-FFF2-40B4-BE49-F238E27FC236}">
-                <a16:creationId xmlns:a16="http://schemas.microsoft.com/office/drawing/2014/main" xmlns="" id="{1E8D2F85-100B-457E-B4C2-85724A6B6872}"/>
+                <a16:creationId xmlns="" xmlns:a16="http://schemas.microsoft.com/office/drawing/2014/main" id="{1E8D2F85-100B-457E-B4C2-85724A6B6872}"/>
               </a:ext>
             </a:extLst>
           </p:cNvPr>
@@ -12294,7 +12296,7 @@
           <p:cNvPr id="13" name="Picture 12" descr="C:\Users\Mike\AppData\Local\Microsoft\Windows\INetCache\Content.Word\servicebus360_logo_blue.png">
             <a:extLst>
               <a:ext uri="{FF2B5EF4-FFF2-40B4-BE49-F238E27FC236}">
-                <a16:creationId xmlns:a16="http://schemas.microsoft.com/office/drawing/2014/main" xmlns="" id="{80B578EA-FECF-4365-B7B3-53A3E8D08896}"/>
+                <a16:creationId xmlns="" xmlns:a16="http://schemas.microsoft.com/office/drawing/2014/main" id="{80B578EA-FECF-4365-B7B3-53A3E8D08896}"/>
               </a:ext>
             </a:extLst>
           </p:cNvPr>
@@ -12333,7 +12335,7 @@
           <p:cNvPr id="14" name="Picture 13" descr="C:\Users\Mike\AppData\Local\Microsoft\Windows\INetCache\Content.Word\Color Logo with Tagline - New Design.png">
             <a:extLst>
               <a:ext uri="{FF2B5EF4-FFF2-40B4-BE49-F238E27FC236}">
-                <a16:creationId xmlns:a16="http://schemas.microsoft.com/office/drawing/2014/main" xmlns="" id="{681B0DF1-56A7-45F6-80BD-89EE6AF88DF6}"/>
+                <a16:creationId xmlns="" xmlns:a16="http://schemas.microsoft.com/office/drawing/2014/main" id="{681B0DF1-56A7-45F6-80BD-89EE6AF88DF6}"/>
               </a:ext>
             </a:extLst>
           </p:cNvPr>
@@ -12446,7 +12448,7 @@
           <p:cNvPr id="14" name="Picture 13">
             <a:extLst>
               <a:ext uri="{FF2B5EF4-FFF2-40B4-BE49-F238E27FC236}">
-                <a16:creationId xmlns:a16="http://schemas.microsoft.com/office/drawing/2014/main" xmlns="" id="{7200624C-0410-4AB7-B50F-B06EBCD628AD}"/>
+                <a16:creationId xmlns="" xmlns:a16="http://schemas.microsoft.com/office/drawing/2014/main" id="{7200624C-0410-4AB7-B50F-B06EBCD628AD}"/>
               </a:ext>
             </a:extLst>
           </p:cNvPr>
@@ -12645,7 +12647,7 @@
             <p:cNvPr id="12" name="TextBox 11">
               <a:extLst>
                 <a:ext uri="{FF2B5EF4-FFF2-40B4-BE49-F238E27FC236}">
-                  <a16:creationId xmlns:a16="http://schemas.microsoft.com/office/drawing/2014/main" xmlns="" id="{CDBFFF62-C9B5-4C03-A0DA-2B2726B2C55E}"/>
+                  <a16:creationId xmlns="" xmlns:a16="http://schemas.microsoft.com/office/drawing/2014/main" id="{CDBFFF62-C9B5-4C03-A0DA-2B2726B2C55E}"/>
                 </a:ext>
               </a:extLst>
             </p:cNvPr>
@@ -12735,7 +12737,7 @@
             <p:cNvPr id="15" name="TextBox 14">
               <a:extLst>
                 <a:ext uri="{FF2B5EF4-FFF2-40B4-BE49-F238E27FC236}">
-                  <a16:creationId xmlns:a16="http://schemas.microsoft.com/office/drawing/2014/main" xmlns="" id="{D5FE5993-C5B8-47A4-892F-8315F6CBBC9A}"/>
+                  <a16:creationId xmlns="" xmlns:a16="http://schemas.microsoft.com/office/drawing/2014/main" id="{D5FE5993-C5B8-47A4-892F-8315F6CBBC9A}"/>
                 </a:ext>
               </a:extLst>
             </p:cNvPr>
@@ -12784,7 +12786,7 @@
             <p:cNvPr id="17" name="Picture 16">
               <a:extLst>
                 <a:ext uri="{FF2B5EF4-FFF2-40B4-BE49-F238E27FC236}">
-                  <a16:creationId xmlns:a16="http://schemas.microsoft.com/office/drawing/2014/main" xmlns="" id="{B6E080B8-4A59-4DD4-8D61-F1E9CEBA630A}"/>
+                  <a16:creationId xmlns="" xmlns:a16="http://schemas.microsoft.com/office/drawing/2014/main" id="{B6E080B8-4A59-4DD4-8D61-F1E9CEBA630A}"/>
                 </a:ext>
               </a:extLst>
             </p:cNvPr>
@@ -12820,7 +12822,7 @@
             <p:cNvPr id="18" name="Picture 17" descr="C:\Users\Mike\AppData\Local\Microsoft\Windows\INetCache\Content.Word\SentryOne-logo-300px.png">
               <a:extLst>
                 <a:ext uri="{FF2B5EF4-FFF2-40B4-BE49-F238E27FC236}">
-                  <a16:creationId xmlns:a16="http://schemas.microsoft.com/office/drawing/2014/main" xmlns="" id="{2D3D6532-E48A-4779-A39C-8D250F239392}"/>
+                  <a16:creationId xmlns="" xmlns:a16="http://schemas.microsoft.com/office/drawing/2014/main" id="{2D3D6532-E48A-4779-A39C-8D250F239392}"/>
                 </a:ext>
               </a:extLst>
             </p:cNvPr>

</xml_diff>